<commit_message>
moved figs and datasets fully into repository. some figure edits as well to inc. fnuc1x4, etc
</commit_message>
<xml_diff>
--- a/Manuscript/figures/MainText/figures.pptx
+++ b/Manuscript/figures/MainText/figures.pptx
@@ -289,7 +289,7 @@
           <a:p>
             <a:fld id="{A95FFBB0-51D8-1047-A4D1-6804AAE3C787}" type="datetimeFigureOut">
               <a:rPr lang="en-US" smtClean="0"/>
-              <a:t>9/10/14</a:t>
+              <a:t>9/12/14</a:t>
             </a:fld>
             <a:endParaRPr lang="en-US"/>
           </a:p>
@@ -459,7 +459,7 @@
           <a:p>
             <a:fld id="{A95FFBB0-51D8-1047-A4D1-6804AAE3C787}" type="datetimeFigureOut">
               <a:rPr lang="en-US" smtClean="0"/>
-              <a:t>9/10/14</a:t>
+              <a:t>9/12/14</a:t>
             </a:fld>
             <a:endParaRPr lang="en-US"/>
           </a:p>
@@ -639,7 +639,7 @@
           <a:p>
             <a:fld id="{A95FFBB0-51D8-1047-A4D1-6804AAE3C787}" type="datetimeFigureOut">
               <a:rPr lang="en-US" smtClean="0"/>
-              <a:t>9/10/14</a:t>
+              <a:t>9/12/14</a:t>
             </a:fld>
             <a:endParaRPr lang="en-US"/>
           </a:p>
@@ -809,7 +809,7 @@
           <a:p>
             <a:fld id="{A95FFBB0-51D8-1047-A4D1-6804AAE3C787}" type="datetimeFigureOut">
               <a:rPr lang="en-US" smtClean="0"/>
-              <a:t>9/10/14</a:t>
+              <a:t>9/12/14</a:t>
             </a:fld>
             <a:endParaRPr lang="en-US"/>
           </a:p>
@@ -1055,7 +1055,7 @@
           <a:p>
             <a:fld id="{A95FFBB0-51D8-1047-A4D1-6804AAE3C787}" type="datetimeFigureOut">
               <a:rPr lang="en-US" smtClean="0"/>
-              <a:t>9/10/14</a:t>
+              <a:t>9/12/14</a:t>
             </a:fld>
             <a:endParaRPr lang="en-US"/>
           </a:p>
@@ -1343,7 +1343,7 @@
           <a:p>
             <a:fld id="{A95FFBB0-51D8-1047-A4D1-6804AAE3C787}" type="datetimeFigureOut">
               <a:rPr lang="en-US" smtClean="0"/>
-              <a:t>9/10/14</a:t>
+              <a:t>9/12/14</a:t>
             </a:fld>
             <a:endParaRPr lang="en-US"/>
           </a:p>
@@ -1765,7 +1765,7 @@
           <a:p>
             <a:fld id="{A95FFBB0-51D8-1047-A4D1-6804AAE3C787}" type="datetimeFigureOut">
               <a:rPr lang="en-US" smtClean="0"/>
-              <a:t>9/10/14</a:t>
+              <a:t>9/12/14</a:t>
             </a:fld>
             <a:endParaRPr lang="en-US"/>
           </a:p>
@@ -1883,7 +1883,7 @@
           <a:p>
             <a:fld id="{A95FFBB0-51D8-1047-A4D1-6804AAE3C787}" type="datetimeFigureOut">
               <a:rPr lang="en-US" smtClean="0"/>
-              <a:t>9/10/14</a:t>
+              <a:t>9/12/14</a:t>
             </a:fld>
             <a:endParaRPr lang="en-US"/>
           </a:p>
@@ -1978,7 +1978,7 @@
           <a:p>
             <a:fld id="{A95FFBB0-51D8-1047-A4D1-6804AAE3C787}" type="datetimeFigureOut">
               <a:rPr lang="en-US" smtClean="0"/>
-              <a:t>9/10/14</a:t>
+              <a:t>9/12/14</a:t>
             </a:fld>
             <a:endParaRPr lang="en-US"/>
           </a:p>
@@ -2255,7 +2255,7 @@
           <a:p>
             <a:fld id="{A95FFBB0-51D8-1047-A4D1-6804AAE3C787}" type="datetimeFigureOut">
               <a:rPr lang="en-US" smtClean="0"/>
-              <a:t>9/10/14</a:t>
+              <a:t>9/12/14</a:t>
             </a:fld>
             <a:endParaRPr lang="en-US"/>
           </a:p>
@@ -2508,7 +2508,7 @@
           <a:p>
             <a:fld id="{A95FFBB0-51D8-1047-A4D1-6804AAE3C787}" type="datetimeFigureOut">
               <a:rPr lang="en-US" smtClean="0"/>
-              <a:t>9/10/14</a:t>
+              <a:t>9/12/14</a:t>
             </a:fld>
             <a:endParaRPr lang="en-US"/>
           </a:p>
@@ -2721,7 +2721,7 @@
           <a:p>
             <a:fld id="{A95FFBB0-51D8-1047-A4D1-6804AAE3C787}" type="datetimeFigureOut">
               <a:rPr lang="en-US" smtClean="0"/>
-              <a:t>9/10/14</a:t>
+              <a:t>9/12/14</a:t>
             </a:fld>
             <a:endParaRPr lang="en-US"/>
           </a:p>
@@ -3104,7 +3104,7 @@
         </p:nvSpPr>
         <p:spPr>
           <a:xfrm>
-            <a:off x="1763372" y="2413989"/>
+            <a:off x="1919291" y="2374762"/>
             <a:ext cx="908702" cy="369332"/>
           </a:xfrm>
           <a:prstGeom prst="rect">
@@ -3176,8 +3176,8 @@
         </p:nvSpPr>
         <p:spPr>
           <a:xfrm>
-            <a:off x="3971379" y="1714964"/>
-            <a:ext cx="876335" cy="276999"/>
+            <a:off x="4134784" y="1714964"/>
+            <a:ext cx="640562" cy="276999"/>
           </a:xfrm>
           <a:prstGeom prst="rect">
             <a:avLst/>
@@ -3212,8 +3212,8 @@
         </p:nvCxnSpPr>
         <p:spPr>
           <a:xfrm flipV="1">
-            <a:off x="2720631" y="2616616"/>
-            <a:ext cx="1039046" cy="3081"/>
+            <a:off x="2772178" y="2616617"/>
+            <a:ext cx="993326" cy="3080"/>
           </a:xfrm>
           <a:prstGeom prst="straightConnector1">
             <a:avLst/>
@@ -3249,7 +3249,7 @@
         </p:nvSpPr>
         <p:spPr>
           <a:xfrm>
-            <a:off x="3765504" y="2201117"/>
+            <a:off x="3806033" y="2201117"/>
             <a:ext cx="1289048" cy="830997"/>
           </a:xfrm>
           <a:prstGeom prst="rect">
@@ -3355,12 +3355,12 @@
         </p:nvCxnSpPr>
         <p:spPr>
           <a:xfrm flipV="1">
-            <a:off x="2182502" y="1974875"/>
-            <a:ext cx="3905905" cy="439114"/>
+            <a:off x="2392921" y="1974875"/>
+            <a:ext cx="3695486" cy="439114"/>
           </a:xfrm>
           <a:prstGeom prst="bentConnector3">
             <a:avLst>
-              <a:gd name="adj1" fmla="val 8"/>
+              <a:gd name="adj1" fmla="val 300"/>
             </a:avLst>
           </a:prstGeom>
           <a:ln>
@@ -3532,36 +3532,6 @@
           </a:p>
         </p:txBody>
       </p:sp>
-      <p:pic>
-        <p:nvPicPr>
-          <p:cNvPr id="81" name="Picture 80" descr="regression_convergence_2panels.pdf"/>
-          <p:cNvPicPr>
-            <a:picLocks noChangeAspect="1"/>
-          </p:cNvPicPr>
-          <p:nvPr/>
-        </p:nvPicPr>
-        <p:blipFill>
-          <a:blip r:embed="rId2">
-            <a:extLst>
-              <a:ext uri="{28A0092B-C50C-407E-A947-70E740481C1C}">
-                <a14:useLocalDpi xmlns:a14="http://schemas.microsoft.com/office/drawing/2010/main" val="0"/>
-              </a:ext>
-            </a:extLst>
-          </a:blip>
-          <a:stretch>
-            <a:fillRect/>
-          </a:stretch>
-        </p:blipFill>
-        <p:spPr>
-          <a:xfrm>
-            <a:off x="1763372" y="3223252"/>
-            <a:ext cx="5276191" cy="2499248"/>
-          </a:xfrm>
-          <a:prstGeom prst="rect">
-            <a:avLst/>
-          </a:prstGeom>
-        </p:spPr>
-      </p:pic>
       <p:cxnSp>
         <p:nvCxnSpPr>
           <p:cNvPr id="99" name="Straight Arrow Connector 98"/>
@@ -3570,8 +3540,8 @@
         </p:nvCxnSpPr>
         <p:spPr>
           <a:xfrm flipV="1">
-            <a:off x="5013717" y="2616616"/>
-            <a:ext cx="1039046" cy="3081"/>
+            <a:off x="5095081" y="2616616"/>
+            <a:ext cx="993326" cy="3081"/>
           </a:xfrm>
           <a:prstGeom prst="straightConnector1">
             <a:avLst/>
@@ -3599,16 +3569,46 @@
           </a:fontRef>
         </p:style>
       </p:cxnSp>
-      <p:sp>
-        <p:nvSpPr>
-          <p:cNvPr id="71" name="TextBox 70"/>
+      <p:pic>
+        <p:nvPicPr>
+          <p:cNvPr id="2" name="Picture 1" descr="regression_convergence.pdf"/>
+          <p:cNvPicPr>
+            <a:picLocks noChangeAspect="1"/>
+          </p:cNvPicPr>
+          <p:nvPr/>
+        </p:nvPicPr>
+        <p:blipFill>
+          <a:blip r:embed="rId2">
+            <a:extLst>
+              <a:ext uri="{28A0092B-C50C-407E-A947-70E740481C1C}">
+                <a14:useLocalDpi xmlns:a14="http://schemas.microsoft.com/office/drawing/2010/main" val="0"/>
+              </a:ext>
+            </a:extLst>
+          </a:blip>
+          <a:stretch>
+            <a:fillRect/>
+          </a:stretch>
+        </p:blipFill>
+        <p:spPr>
+          <a:xfrm>
+            <a:off x="1663726" y="3189558"/>
+            <a:ext cx="5452244" cy="2582642"/>
+          </a:xfrm>
+          <a:prstGeom prst="rect">
+            <a:avLst/>
+          </a:prstGeom>
+        </p:spPr>
+      </p:pic>
+      <p:sp>
+        <p:nvSpPr>
+          <p:cNvPr id="23" name="TextBox 22"/>
           <p:cNvSpPr txBox="1"/>
           <p:nvPr/>
         </p:nvSpPr>
         <p:spPr>
           <a:xfrm>
-            <a:off x="1663726" y="1463040"/>
-            <a:ext cx="353576" cy="461665"/>
+            <a:off x="1919291" y="1468742"/>
+            <a:ext cx="308290" cy="461665"/>
           </a:xfrm>
           <a:prstGeom prst="rect">
             <a:avLst/>
@@ -3622,13 +3622,13 @@
           <a:lstStyle/>
           <a:p>
             <a:r>
-              <a:rPr lang="en-US" sz="2300" dirty="0" smtClean="0">
+              <a:rPr lang="en-US" sz="2400" dirty="0" smtClean="0">
                 <a:latin typeface="Arial"/>
                 <a:cs typeface="Arial"/>
               </a:rPr>
               <a:t>A</a:t>
             </a:r>
-            <a:endParaRPr lang="en-US" sz="2300" dirty="0">
+            <a:endParaRPr lang="en-US" sz="2400" dirty="0">
               <a:latin typeface="Arial"/>
               <a:cs typeface="Arial"/>
             </a:endParaRPr>
@@ -3665,9 +3665,81 @@
           <a:chExt cx="0" cy="0"/>
         </a:xfrm>
       </p:grpSpPr>
+      <p:sp>
+        <p:nvSpPr>
+          <p:cNvPr id="6" name="TextBox 5"/>
+          <p:cNvSpPr txBox="1"/>
+          <p:nvPr/>
+        </p:nvSpPr>
+        <p:spPr>
+          <a:xfrm>
+            <a:off x="3386558" y="357870"/>
+            <a:ext cx="2057804" cy="307777"/>
+          </a:xfrm>
+          <a:prstGeom prst="rect">
+            <a:avLst/>
+          </a:prstGeom>
+          <a:noFill/>
+        </p:spPr>
+        <p:txBody>
+          <a:bodyPr wrap="square" rtlCol="0">
+            <a:spAutoFit/>
+          </a:bodyPr>
+          <a:lstStyle/>
+          <a:p>
+            <a:r>
+              <a:rPr lang="en-US" sz="1400" dirty="0" smtClean="0">
+                <a:latin typeface="Arial"/>
+                <a:cs typeface="Arial"/>
+              </a:rPr>
+              <a:t>Empirical Frequencies</a:t>
+            </a:r>
+            <a:endParaRPr lang="en-US" sz="1400" dirty="0">
+              <a:latin typeface="Arial"/>
+              <a:cs typeface="Arial"/>
+            </a:endParaRPr>
+          </a:p>
+        </p:txBody>
+      </p:sp>
+      <p:sp>
+        <p:nvSpPr>
+          <p:cNvPr id="7" name="TextBox 6"/>
+          <p:cNvSpPr txBox="1"/>
+          <p:nvPr/>
+        </p:nvSpPr>
+        <p:spPr>
+          <a:xfrm>
+            <a:off x="3538958" y="3388876"/>
+            <a:ext cx="1611432" cy="307777"/>
+          </a:xfrm>
+          <a:prstGeom prst="rect">
+            <a:avLst/>
+          </a:prstGeom>
+          <a:noFill/>
+        </p:spPr>
+        <p:txBody>
+          <a:bodyPr wrap="square" rtlCol="0">
+            <a:spAutoFit/>
+          </a:bodyPr>
+          <a:lstStyle/>
+          <a:p>
+            <a:r>
+              <a:rPr lang="en-US" sz="1400" dirty="0" smtClean="0">
+                <a:latin typeface="Arial"/>
+                <a:cs typeface="Arial"/>
+              </a:rPr>
+              <a:t>True Frequencies</a:t>
+            </a:r>
+            <a:endParaRPr lang="en-US" sz="1400" dirty="0">
+              <a:latin typeface="Arial"/>
+              <a:cs typeface="Arial"/>
+            </a:endParaRPr>
+          </a:p>
+        </p:txBody>
+      </p:sp>
       <p:pic>
         <p:nvPicPr>
-          <p:cNvPr id="4" name="Picture 3" descr="nyp_bias_r2.pdf"/>
+          <p:cNvPr id="2" name="Picture 1" descr="nyp_bias_r2.pdf"/>
           <p:cNvPicPr>
             <a:picLocks noChangeAspect="1"/>
           </p:cNvPicPr>
@@ -3681,13 +3753,13 @@
               </a:ext>
             </a:extLst>
           </a:blip>
-          <a:srcRect b="49340"/>
+          <a:srcRect b="49457"/>
           <a:stretch/>
         </p:blipFill>
         <p:spPr>
           <a:xfrm>
-            <a:off x="1580743" y="635080"/>
-            <a:ext cx="5667007" cy="2296727"/>
+            <a:off x="1301712" y="635081"/>
+            <a:ext cx="6143686" cy="2484154"/>
           </a:xfrm>
           <a:prstGeom prst="rect">
             <a:avLst/>
@@ -3696,105 +3768,33 @@
       </p:pic>
       <p:pic>
         <p:nvPicPr>
-          <p:cNvPr id="5" name="Picture 4" descr="nyp_bias_r2.pdf"/>
+          <p:cNvPr id="8" name="Picture 7" descr="nyp_bias_r2.pdf"/>
           <p:cNvPicPr>
             <a:picLocks noChangeAspect="1"/>
           </p:cNvPicPr>
           <p:nvPr/>
         </p:nvPicPr>
         <p:blipFill rotWithShape="1">
-          <a:blip r:embed="rId3">
+          <a:blip r:embed="rId2">
             <a:extLst>
               <a:ext uri="{28A0092B-C50C-407E-A947-70E740481C1C}">
                 <a14:useLocalDpi xmlns:a14="http://schemas.microsoft.com/office/drawing/2010/main" val="0"/>
               </a:ext>
             </a:extLst>
           </a:blip>
-          <a:srcRect t="50660"/>
+          <a:srcRect t="50543"/>
           <a:stretch/>
         </p:blipFill>
         <p:spPr>
           <a:xfrm>
-            <a:off x="1580743" y="3586266"/>
-            <a:ext cx="5667007" cy="2236879"/>
+            <a:off x="1301712" y="3685346"/>
+            <a:ext cx="6143686" cy="2430794"/>
           </a:xfrm>
           <a:prstGeom prst="rect">
             <a:avLst/>
           </a:prstGeom>
         </p:spPr>
       </p:pic>
-      <p:sp>
-        <p:nvSpPr>
-          <p:cNvPr id="6" name="TextBox 5"/>
-          <p:cNvSpPr txBox="1"/>
-          <p:nvPr/>
-        </p:nvSpPr>
-        <p:spPr>
-          <a:xfrm>
-            <a:off x="3386558" y="327303"/>
-            <a:ext cx="2057804" cy="307777"/>
-          </a:xfrm>
-          <a:prstGeom prst="rect">
-            <a:avLst/>
-          </a:prstGeom>
-          <a:noFill/>
-        </p:spPr>
-        <p:txBody>
-          <a:bodyPr wrap="square" rtlCol="0">
-            <a:spAutoFit/>
-          </a:bodyPr>
-          <a:lstStyle/>
-          <a:p>
-            <a:r>
-              <a:rPr lang="en-US" sz="1400" dirty="0" smtClean="0">
-                <a:latin typeface="Arial"/>
-                <a:cs typeface="Arial"/>
-              </a:rPr>
-              <a:t>Empirical Frequencies</a:t>
-            </a:r>
-            <a:endParaRPr lang="en-US" sz="1400" dirty="0">
-              <a:latin typeface="Arial"/>
-              <a:cs typeface="Arial"/>
-            </a:endParaRPr>
-          </a:p>
-        </p:txBody>
-      </p:sp>
-      <p:sp>
-        <p:nvSpPr>
-          <p:cNvPr id="7" name="TextBox 6"/>
-          <p:cNvSpPr txBox="1"/>
-          <p:nvPr/>
-        </p:nvSpPr>
-        <p:spPr>
-          <a:xfrm>
-            <a:off x="3538958" y="3278489"/>
-            <a:ext cx="1611432" cy="307777"/>
-          </a:xfrm>
-          <a:prstGeom prst="rect">
-            <a:avLst/>
-          </a:prstGeom>
-          <a:noFill/>
-        </p:spPr>
-        <p:txBody>
-          <a:bodyPr wrap="square" rtlCol="0">
-            <a:spAutoFit/>
-          </a:bodyPr>
-          <a:lstStyle/>
-          <a:p>
-            <a:r>
-              <a:rPr lang="en-US" sz="1400" dirty="0" smtClean="0">
-                <a:latin typeface="Arial"/>
-                <a:cs typeface="Arial"/>
-              </a:rPr>
-              <a:t>True Frequencies</a:t>
-            </a:r>
-            <a:endParaRPr lang="en-US" sz="1400" dirty="0">
-              <a:latin typeface="Arial"/>
-              <a:cs typeface="Arial"/>
-            </a:endParaRPr>
-          </a:p>
-        </p:txBody>
-      </p:sp>
     </p:spTree>
     <p:extLst>
       <p:ext uri="{BB962C8B-B14F-4D97-AF65-F5344CB8AC3E}">

</xml_diff>